<commit_message>
final with markku revision
</commit_message>
<xml_diff>
--- a/SchedulerImplementation-2/Figures/overall_scheduling.pptx
+++ b/SchedulerImplementation-2/Figures/overall_scheduling.pptx
@@ -3236,31 +3236,12 @@
                         </m:ctrlPr>
                       </m:fPr>
                       <m:num>
-                        <m:sSub>
-                          <m:sSubPr>
-                            <m:ctrlPr>
-                              <a:rPr lang="en-US" sz="1000" i="1" smtClean="0">
-                                <a:latin typeface="Cambria Math"/>
-                              </a:rPr>
-                            </m:ctrlPr>
-                          </m:sSubPr>
-                          <m:e>
-                            <m:r>
-                              <a:rPr lang="en-US" sz="1000" b="0" i="1" smtClean="0">
-                                <a:latin typeface="Cambria Math"/>
-                              </a:rPr>
-                              <m:t>𝑁</m:t>
-                            </m:r>
-                          </m:e>
-                          <m:sub>
-                            <m:r>
-                              <a:rPr lang="en-US" sz="1000" b="0" i="1" smtClean="0">
-                                <a:latin typeface="Cambria Math"/>
-                              </a:rPr>
-                              <m:t>𝐾</m:t>
-                            </m:r>
-                          </m:sub>
-                        </m:sSub>
+                        <m:r>
+                          <a:rPr lang="en-US" sz="1000" b="0" i="1" smtClean="0">
+                            <a:latin typeface="Cambria Math"/>
+                          </a:rPr>
+                          <m:t>𝐾</m:t>
+                        </m:r>
                       </m:num>
                       <m:den>
                         <m:r>
@@ -3716,31 +3697,12 @@
                         </m:ctrlPr>
                       </m:fPr>
                       <m:num>
-                        <m:sSub>
-                          <m:sSubPr>
-                            <m:ctrlPr>
-                              <a:rPr lang="en-US" sz="1000" i="1" smtClean="0">
-                                <a:latin typeface="Cambria Math"/>
-                              </a:rPr>
-                            </m:ctrlPr>
-                          </m:sSubPr>
-                          <m:e>
-                            <m:r>
-                              <a:rPr lang="en-US" sz="1000" b="0" i="1" smtClean="0">
-                                <a:latin typeface="Cambria Math"/>
-                              </a:rPr>
-                              <m:t>𝑁</m:t>
-                            </m:r>
-                          </m:e>
-                          <m:sub>
-                            <m:r>
-                              <a:rPr lang="en-US" sz="1000" b="0" i="1" smtClean="0">
-                                <a:latin typeface="Cambria Math"/>
-                              </a:rPr>
-                              <m:t>𝐾</m:t>
-                            </m:r>
-                          </m:sub>
-                        </m:sSub>
+                        <m:r>
+                          <a:rPr lang="en-US" sz="1000" i="1" smtClean="0">
+                            <a:latin typeface="Cambria Math"/>
+                          </a:rPr>
+                          <m:t>𝐾</m:t>
+                        </m:r>
                       </m:num>
                       <m:den>
                         <m:r>
@@ -4026,31 +3988,12 @@
                         </m:ctrlPr>
                       </m:fPr>
                       <m:num>
-                        <m:sSub>
-                          <m:sSubPr>
-                            <m:ctrlPr>
-                              <a:rPr lang="en-US" sz="1000" i="1" smtClean="0">
-                                <a:latin typeface="Cambria Math"/>
-                              </a:rPr>
-                            </m:ctrlPr>
-                          </m:sSubPr>
-                          <m:e>
-                            <m:r>
-                              <a:rPr lang="en-US" sz="1000" b="0" i="1" smtClean="0">
-                                <a:latin typeface="Cambria Math"/>
-                              </a:rPr>
-                              <m:t>𝑁</m:t>
-                            </m:r>
-                          </m:e>
-                          <m:sub>
-                            <m:r>
-                              <a:rPr lang="en-US" sz="1000" b="0" i="1" smtClean="0">
-                                <a:latin typeface="Cambria Math"/>
-                              </a:rPr>
-                              <m:t>𝐾</m:t>
-                            </m:r>
-                          </m:sub>
-                        </m:sSub>
+                        <m:r>
+                          <a:rPr lang="en-US" sz="1000" b="0" i="1" smtClean="0">
+                            <a:latin typeface="Cambria Math"/>
+                          </a:rPr>
+                          <m:t>𝐾</m:t>
+                        </m:r>
                       </m:num>
                       <m:den>
                         <m:r>

</xml_diff>